<commit_message>
Plotting function now returns linear and db scale instead of just db scale. Made additions to simulation comparisons/powerpoint.
</commit_message>
<xml_diff>
--- a/examples/ydfa_examples/Python vs MATLAB Simulations.pptx
+++ b/examples/ydfa_examples/Python vs MATLAB Simulations.pptx
@@ -109,6 +109,11 @@
       </a:defRPr>
     </a:lvl9pPr>
   </p:defaultTextStyle>
+  <p:extLst>
+    <p:ext uri="{EFAFB233-063F-42B5-8137-9DF3F51BA10A}">
+      <p15:sldGuideLst xmlns:p15="http://schemas.microsoft.com/office/powerpoint/2012/main"/>
+    </p:ext>
+  </p:extLst>
 </p:presentation>
 </file>
 
@@ -3486,8 +3491,8 @@
         </p:blipFill>
         <p:spPr>
           <a:xfrm>
-            <a:off x="5885217" y="1343818"/>
-            <a:ext cx="6306783" cy="4391061"/>
+            <a:off x="0" y="2718816"/>
+            <a:ext cx="5945018" cy="4139184"/>
           </a:xfrm>
           <a:prstGeom prst="rect">
             <a:avLst/>
@@ -3516,8 +3521,38 @@
         </p:blipFill>
         <p:spPr>
           <a:xfrm>
-            <a:off x="-1" y="2137242"/>
+            <a:off x="3153391" y="0"/>
             <a:ext cx="5885217" cy="2583515"/>
+          </a:xfrm>
+          <a:prstGeom prst="rect">
+            <a:avLst/>
+          </a:prstGeom>
+        </p:spPr>
+      </p:pic>
+      <p:pic>
+        <p:nvPicPr>
+          <p:cNvPr id="4" name="Picture 3" descr="A collage of images of a spectrum&#10;&#10;AI-generated content may be incorrect.">
+            <a:extLst>
+              <a:ext uri="{FF2B5EF4-FFF2-40B4-BE49-F238E27FC236}">
+                <a16:creationId xmlns:a16="http://schemas.microsoft.com/office/drawing/2014/main" id="{DF1FC117-C124-74AA-6C75-3608C8C79870}"/>
+              </a:ext>
+            </a:extLst>
+          </p:cNvPr>
+          <p:cNvPicPr>
+            <a:picLocks noChangeAspect="1"/>
+          </p:cNvPicPr>
+          <p:nvPr/>
+        </p:nvPicPr>
+        <p:blipFill>
+          <a:blip r:embed="rId4"/>
+          <a:stretch>
+            <a:fillRect/>
+          </a:stretch>
+        </p:blipFill>
+        <p:spPr>
+          <a:xfrm>
+            <a:off x="5811049" y="2718816"/>
+            <a:ext cx="6380949" cy="4139184"/>
           </a:xfrm>
           <a:prstGeom prst="rect">
             <a:avLst/>
@@ -3615,8 +3650,8 @@
         </p:blipFill>
         <p:spPr>
           <a:xfrm>
-            <a:off x="0" y="2030394"/>
-            <a:ext cx="5989763" cy="2797212"/>
+            <a:off x="3425952" y="0"/>
+            <a:ext cx="4985551" cy="2328246"/>
           </a:xfrm>
           <a:prstGeom prst="rect">
             <a:avLst/>
@@ -3645,8 +3680,38 @@
         </p:blipFill>
         <p:spPr>
           <a:xfrm>
-            <a:off x="5989763" y="1239628"/>
-            <a:ext cx="6202237" cy="4651678"/>
+            <a:off x="0" y="2267746"/>
+            <a:ext cx="6096000" cy="4572000"/>
+          </a:xfrm>
+          <a:prstGeom prst="rect">
+            <a:avLst/>
+          </a:prstGeom>
+        </p:spPr>
+      </p:pic>
+      <p:pic>
+        <p:nvPicPr>
+          <p:cNvPr id="8" name="Picture 7" descr="A group of graphs showing different colors&#10;&#10;AI-generated content may be incorrect.">
+            <a:extLst>
+              <a:ext uri="{FF2B5EF4-FFF2-40B4-BE49-F238E27FC236}">
+                <a16:creationId xmlns:a16="http://schemas.microsoft.com/office/drawing/2014/main" id="{26CBAC7E-FA9D-9C0A-CE7F-D8902BE30D22}"/>
+              </a:ext>
+            </a:extLst>
+          </p:cNvPr>
+          <p:cNvPicPr>
+            <a:picLocks noChangeAspect="1"/>
+          </p:cNvPicPr>
+          <p:nvPr/>
+        </p:nvPicPr>
+        <p:blipFill>
+          <a:blip r:embed="rId4"/>
+          <a:stretch>
+            <a:fillRect/>
+          </a:stretch>
+        </p:blipFill>
+        <p:spPr>
+          <a:xfrm>
+            <a:off x="6186187" y="2346501"/>
+            <a:ext cx="6005814" cy="4511499"/>
           </a:xfrm>
           <a:prstGeom prst="rect">
             <a:avLst/>
@@ -3855,8 +3920,8 @@
         </p:blipFill>
         <p:spPr>
           <a:xfrm>
-            <a:off x="5338276" y="1343818"/>
-            <a:ext cx="6756076" cy="4577406"/>
+            <a:off x="0" y="2839876"/>
+            <a:ext cx="5930595" cy="4018123"/>
           </a:xfrm>
           <a:prstGeom prst="rect">
             <a:avLst/>
@@ -3885,8 +3950,38 @@
         </p:blipFill>
         <p:spPr>
           <a:xfrm>
-            <a:off x="0" y="2570205"/>
-            <a:ext cx="5338276" cy="2395432"/>
+            <a:off x="3208091" y="18255"/>
+            <a:ext cx="6086115" cy="2731008"/>
+          </a:xfrm>
+          <a:prstGeom prst="rect">
+            <a:avLst/>
+          </a:prstGeom>
+        </p:spPr>
+      </p:pic>
+      <p:pic>
+        <p:nvPicPr>
+          <p:cNvPr id="5" name="Picture 4">
+            <a:extLst>
+              <a:ext uri="{FF2B5EF4-FFF2-40B4-BE49-F238E27FC236}">
+                <a16:creationId xmlns:a16="http://schemas.microsoft.com/office/drawing/2014/main" id="{0E1102FB-908A-8095-9F19-F8F94C0DC4E4}"/>
+              </a:ext>
+            </a:extLst>
+          </p:cNvPr>
+          <p:cNvPicPr>
+            <a:picLocks noChangeAspect="1"/>
+          </p:cNvPicPr>
+          <p:nvPr/>
+        </p:nvPicPr>
+        <p:blipFill>
+          <a:blip r:embed="rId4"/>
+          <a:stretch>
+            <a:fillRect/>
+          </a:stretch>
+        </p:blipFill>
+        <p:spPr>
+          <a:xfrm>
+            <a:off x="6026775" y="2950464"/>
+            <a:ext cx="6165223" cy="3907536"/>
           </a:xfrm>
           <a:prstGeom prst="rect">
             <a:avLst/>
@@ -3984,8 +4079,8 @@
         </p:blipFill>
         <p:spPr>
           <a:xfrm>
-            <a:off x="5609844" y="1168764"/>
-            <a:ext cx="6569676" cy="4927257"/>
+            <a:off x="-1" y="2283688"/>
+            <a:ext cx="6099083" cy="4574312"/>
           </a:xfrm>
           <a:prstGeom prst="rect">
             <a:avLst/>
@@ -4014,8 +4109,38 @@
         </p:blipFill>
         <p:spPr>
           <a:xfrm>
-            <a:off x="12480" y="2229708"/>
-            <a:ext cx="5609844" cy="2619790"/>
+            <a:off x="4096512" y="18255"/>
+            <a:ext cx="4860578" cy="2269884"/>
+          </a:xfrm>
+          <a:prstGeom prst="rect">
+            <a:avLst/>
+          </a:prstGeom>
+        </p:spPr>
+      </p:pic>
+      <p:pic>
+        <p:nvPicPr>
+          <p:cNvPr id="4" name="Picture 3" descr="A group of graphs showing different colors&#10;&#10;AI-generated content may be incorrect.">
+            <a:extLst>
+              <a:ext uri="{FF2B5EF4-FFF2-40B4-BE49-F238E27FC236}">
+                <a16:creationId xmlns:a16="http://schemas.microsoft.com/office/drawing/2014/main" id="{213C359F-A2C4-61D6-5487-2539B8EC349C}"/>
+              </a:ext>
+            </a:extLst>
+          </p:cNvPr>
+          <p:cNvPicPr>
+            <a:picLocks noChangeAspect="1"/>
+          </p:cNvPicPr>
+          <p:nvPr/>
+        </p:nvPicPr>
+        <p:blipFill>
+          <a:blip r:embed="rId4"/>
+          <a:stretch>
+            <a:fillRect/>
+          </a:stretch>
+        </p:blipFill>
+        <p:spPr>
+          <a:xfrm>
+            <a:off x="6096000" y="2283688"/>
+            <a:ext cx="6099082" cy="4574312"/>
           </a:xfrm>
           <a:prstGeom prst="rect">
             <a:avLst/>

</xml_diff>